<commit_message>
Presentation Pension management system
</commit_message>
<xml_diff>
--- a/Mini_project_presentation/MiniProject_Batch4_group106.pptx
+++ b/Mini_project_presentation/MiniProject_Batch4_group106.pptx
@@ -3349,7 +3349,7 @@
         </p:nvSpPr>
         <p:spPr>
           <a:xfrm>
-            <a:off x="4387383" y="2585285"/>
+            <a:off x="4368721" y="3537008"/>
             <a:ext cx="6524430" cy="2126864"/>
           </a:xfrm>
           <a:prstGeom prst="rect">
@@ -3531,8 +3531,8 @@
         </p:nvSpPr>
         <p:spPr>
           <a:xfrm>
-            <a:off x="1794985" y="2585285"/>
-            <a:ext cx="2230546" cy="1077218"/>
+            <a:off x="2398181" y="3059382"/>
+            <a:ext cx="3941079" cy="523220"/>
           </a:xfrm>
           <a:prstGeom prst="rect">
             <a:avLst/>
@@ -3546,6 +3546,19 @@
           <a:lstStyle/>
           <a:p>
             <a:pPr algn="ctr"/>
+            <a:r>
+              <a:rPr lang="en-US" sz="2400" u="sng" dirty="0">
+                <a:ln w="0"/>
+                <a:effectLst>
+                  <a:outerShdw blurRad="38100" dist="19050" dir="2700000" algn="tl" rotWithShape="0">
+                    <a:schemeClr val="dk1">
+                      <a:alpha val="40000"/>
+                    </a:schemeClr>
+                  </a:outerShdw>
+                </a:effectLst>
+              </a:rPr>
+              <a:t>SUBMITTED</a:t>
+            </a:r>
             <a:r>
               <a:rPr lang="en-US" sz="2400" dirty="0">
                 <a:ln w="0"/>
@@ -3557,7 +3570,20 @@
                   </a:outerShdw>
                 </a:effectLst>
               </a:rPr>
-              <a:t>SUBMITTED BY</a:t>
+              <a:t> </a:t>
+            </a:r>
+            <a:r>
+              <a:rPr lang="en-US" sz="2400" u="sng" dirty="0">
+                <a:ln w="0"/>
+                <a:effectLst>
+                  <a:outerShdw blurRad="38100" dist="19050" dir="2700000" algn="tl" rotWithShape="0">
+                    <a:schemeClr val="dk1">
+                      <a:alpha val="40000"/>
+                    </a:schemeClr>
+                  </a:outerShdw>
+                </a:effectLst>
+              </a:rPr>
+              <a:t>BY</a:t>
             </a:r>
             <a:r>
               <a:rPr lang="en-US" sz="2800" dirty="0">
@@ -3570,11 +3596,8 @@
                   </a:outerShdw>
                 </a:effectLst>
               </a:rPr>
-              <a:t>: </a:t>
-            </a:r>
-          </a:p>
-          <a:p>
-            <a:pPr algn="ctr"/>
+              <a:t>:  </a:t>
+            </a:r>
             <a:r>
               <a:rPr lang="en-US" dirty="0">
                 <a:ln w="0"/>
@@ -3586,11 +3609,8 @@
                   </a:outerShdw>
                 </a:effectLst>
               </a:rPr>
-              <a:t>BATCH-4</a:t>
-            </a:r>
-          </a:p>
-          <a:p>
-            <a:pPr algn="ctr"/>
+              <a:t>BATCH-4 </a:t>
+            </a:r>
             <a:r>
               <a:rPr lang="en-US" b="0" cap="none" spc="0" dirty="0">
                 <a:ln w="0"/>
@@ -3900,37 +3920,41 @@
         </p:spPr>
         <p:txBody>
           <a:bodyPr>
-            <a:normAutofit fontScale="85000" lnSpcReduction="20000"/>
+            <a:normAutofit fontScale="92500"/>
           </a:bodyPr>
           <a:lstStyle/>
           <a:p>
             <a:r>
+              <a:rPr lang="en-US" sz="2400" dirty="0"/>
+              <a:t>Provision to define the rules and regulation for each scheme as per government laws. </a:t>
+            </a:r>
+          </a:p>
+          <a:p>
+            <a:pPr marL="0" indent="0">
+              <a:buNone/>
+            </a:pPr>
+            <a:endParaRPr lang="en-US" sz="2400" dirty="0"/>
+          </a:p>
+          <a:p>
+            <a:r>
+              <a:rPr lang="en-US" sz="2400" dirty="0"/>
+              <a:t>Provision to manage the monthly payments. </a:t>
+            </a:r>
+          </a:p>
+          <a:p>
+            <a:pPr marL="0" indent="0">
+              <a:buNone/>
+            </a:pPr>
+            <a:endParaRPr lang="en-US" sz="2400" dirty="0"/>
+          </a:p>
+          <a:p>
+            <a:r>
+              <a:rPr lang="en-US" sz="2400" dirty="0"/>
+              <a:t>Provision to manage the fund amount by each scheme, Fund , Assess Class and Employer each month</a:t>
+            </a:r>
+            <a:r>
               <a:rPr lang="en-US" dirty="0"/>
-              <a:t>Provision to define the rules and regulation for each scheme as per government laws. </a:t>
-            </a:r>
-          </a:p>
-          <a:p>
-            <a:pPr marL="0" indent="0">
-              <a:buNone/>
-            </a:pPr>
-            <a:endParaRPr lang="en-US" dirty="0"/>
-          </a:p>
-          <a:p>
-            <a:r>
-              <a:rPr lang="en-US" dirty="0"/>
-              <a:t>Provision to manage the monthly payments. </a:t>
-            </a:r>
-          </a:p>
-          <a:p>
-            <a:pPr marL="0" indent="0">
-              <a:buNone/>
-            </a:pPr>
-            <a:endParaRPr lang="en-US" dirty="0"/>
-          </a:p>
-          <a:p>
-            <a:r>
-              <a:rPr lang="en-US" dirty="0"/>
-              <a:t>Provision to manage the fund amount by each scheme, Fund , Assess Class and Employer each month.</a:t>
+              <a:t>.</a:t>
             </a:r>
           </a:p>
         </p:txBody>
@@ -4224,8 +4248,8 @@
         </p:nvSpPr>
         <p:spPr>
           <a:xfrm>
-            <a:off x="959498" y="1517717"/>
-            <a:ext cx="10515600" cy="2499114"/>
+            <a:off x="800877" y="1184990"/>
+            <a:ext cx="7064829" cy="4360569"/>
           </a:xfrm>
         </p:spPr>
         <p:txBody>
@@ -4234,9 +4258,54 @@
           </a:bodyPr>
           <a:lstStyle/>
           <a:p>
-            <a:r>
-              <a:rPr lang="en-US" dirty="0"/>
-              <a:t>Type here</a:t>
+            <a:pPr marL="0" indent="0">
+              <a:buNone/>
+            </a:pPr>
+            <a:r>
+              <a:rPr lang="en-US" sz="2000" dirty="0"/>
+              <a:t>Microservices are individual components that work together to deliver an overall solution.</a:t>
+            </a:r>
+          </a:p>
+          <a:p>
+            <a:r>
+              <a:rPr lang="en-US" sz="2000" dirty="0"/>
+              <a:t>It is better suited for the smaller and well portioned, web-based system.</a:t>
+            </a:r>
+          </a:p>
+          <a:p>
+            <a:r>
+              <a:rPr lang="en-US" sz="2000" dirty="0"/>
+              <a:t>The application  is safe when it comes to both data reliability.</a:t>
+            </a:r>
+          </a:p>
+          <a:p>
+            <a:r>
+              <a:rPr lang="en-US" sz="2000" dirty="0"/>
+              <a:t>The concept of microservices makes it easy for upgradation. </a:t>
+            </a:r>
+          </a:p>
+          <a:p>
+            <a:r>
+              <a:rPr lang="en-US" sz="2000" dirty="0"/>
+              <a:t>Easier to scale each individual microservices.</a:t>
+            </a:r>
+          </a:p>
+          <a:p>
+            <a:r>
+              <a:rPr lang="en-US" sz="2000" dirty="0"/>
+              <a:t>Clear ownership and accountability.</a:t>
+            </a:r>
+          </a:p>
+          <a:p>
+            <a:r>
+              <a:rPr lang="en-US" sz="2000" dirty="0"/>
+              <a:t>Easier to maintain and evolve system.</a:t>
+            </a:r>
+          </a:p>
+          <a:p>
+            <a:r>
+              <a:rPr lang="en-US" sz="2000" dirty="0"/>
+              <a:t>Short time to add new features.</a:t>
             </a:r>
           </a:p>
         </p:txBody>
@@ -4449,10 +4518,46 @@
       </p:sp>
       <p:pic>
         <p:nvPicPr>
-          <p:cNvPr id="5" name="Picture 4">
-            <a:extLst>
-              <a:ext uri="{FF2B5EF4-FFF2-40B4-BE49-F238E27FC236}">
-                <a16:creationId xmlns:a16="http://schemas.microsoft.com/office/drawing/2014/main" id="{B0033062-7EA1-C965-B9BA-3B145DF7CB9B}"/>
+          <p:cNvPr id="6" name="Picture 5">
+            <a:extLst>
+              <a:ext uri="{FF2B5EF4-FFF2-40B4-BE49-F238E27FC236}">
+                <a16:creationId xmlns:a16="http://schemas.microsoft.com/office/drawing/2014/main" id="{6EB92184-4AB9-3751-6948-9F4F0D779BC9}"/>
+              </a:ext>
+            </a:extLst>
+          </p:cNvPr>
+          <p:cNvPicPr>
+            <a:picLocks noChangeAspect="1"/>
+          </p:cNvPicPr>
+          <p:nvPr/>
+        </p:nvPicPr>
+        <p:blipFill>
+          <a:blip r:embed="rId2">
+            <a:extLst>
+              <a:ext uri="{28A0092B-C50C-407E-A947-70E740481C1C}">
+                <a14:useLocalDpi xmlns:a14="http://schemas.microsoft.com/office/drawing/2010/main" val="0"/>
+              </a:ext>
+            </a:extLst>
+          </a:blip>
+          <a:stretch>
+            <a:fillRect/>
+          </a:stretch>
+        </p:blipFill>
+        <p:spPr>
+          <a:xfrm>
+            <a:off x="8347885" y="4427375"/>
+            <a:ext cx="3043238" cy="1885950"/>
+          </a:xfrm>
+          <a:prstGeom prst="rect">
+            <a:avLst/>
+          </a:prstGeom>
+        </p:spPr>
+      </p:pic>
+      <p:pic>
+        <p:nvPicPr>
+          <p:cNvPr id="7" name="Picture 6">
+            <a:extLst>
+              <a:ext uri="{FF2B5EF4-FFF2-40B4-BE49-F238E27FC236}">
+                <a16:creationId xmlns:a16="http://schemas.microsoft.com/office/drawing/2014/main" id="{CF303AE0-46B9-68B9-A9EF-8C7B33467E1E}"/>
               </a:ext>
             </a:extLst>
           </p:cNvPr>
@@ -4462,7 +4567,7 @@
           <p:nvPr/>
         </p:nvPicPr>
         <p:blipFill rotWithShape="1">
-          <a:blip r:embed="rId2">
+          <a:blip r:embed="rId3">
             <a:extLst>
               <a:ext uri="{28A0092B-C50C-407E-A947-70E740481C1C}">
                 <a14:useLocalDpi xmlns:a14="http://schemas.microsoft.com/office/drawing/2010/main" val="0"/>
@@ -4474,7 +4579,7 @@
         </p:blipFill>
         <p:spPr>
           <a:xfrm>
-            <a:off x="8089641" y="1184990"/>
+            <a:off x="7937245" y="1143002"/>
             <a:ext cx="3638935" cy="2892886"/>
           </a:xfrm>
           <a:prstGeom prst="rect">
@@ -6128,6 +6233,41 @@
           </a:p>
         </p:txBody>
       </p:sp>
+      <p:pic>
+        <p:nvPicPr>
+          <p:cNvPr id="3" name="Picture 2">
+            <a:extLst>
+              <a:ext uri="{FF2B5EF4-FFF2-40B4-BE49-F238E27FC236}">
+                <a16:creationId xmlns:a16="http://schemas.microsoft.com/office/drawing/2014/main" id="{B792E578-FA42-3EFD-7EB5-765034F7A0FD}"/>
+              </a:ext>
+            </a:extLst>
+          </p:cNvPr>
+          <p:cNvPicPr>
+            <a:picLocks noChangeAspect="1"/>
+          </p:cNvPicPr>
+          <p:nvPr/>
+        </p:nvPicPr>
+        <p:blipFill rotWithShape="1">
+          <a:blip r:embed="rId2">
+            <a:extLst>
+              <a:ext uri="{28A0092B-C50C-407E-A947-70E740481C1C}">
+                <a14:useLocalDpi xmlns:a14="http://schemas.microsoft.com/office/drawing/2010/main" val="0"/>
+              </a:ext>
+            </a:extLst>
+          </a:blip>
+          <a:srcRect l="3008" b="4509"/>
+          <a:stretch/>
+        </p:blipFill>
+        <p:spPr>
+          <a:xfrm>
+            <a:off x="6363813" y="1632795"/>
+            <a:ext cx="5305672" cy="2855229"/>
+          </a:xfrm>
+          <a:prstGeom prst="rect">
+            <a:avLst/>
+          </a:prstGeom>
+        </p:spPr>
+      </p:pic>
     </p:spTree>
     <p:extLst>
       <p:ext uri="{BB962C8B-B14F-4D97-AF65-F5344CB8AC3E}">
@@ -6896,8 +7036,8 @@
         </p:nvSpPr>
         <p:spPr>
           <a:xfrm>
-            <a:off x="449420" y="929886"/>
-            <a:ext cx="11885646" cy="2499114"/>
+            <a:off x="449420" y="929885"/>
+            <a:ext cx="7128375" cy="5186817"/>
           </a:xfrm>
           <a:prstGeom prst="rect">
             <a:avLst/>
@@ -7122,6 +7262,42 @@
           </a:p>
         </p:txBody>
       </p:sp>
+      <p:pic>
+        <p:nvPicPr>
+          <p:cNvPr id="3" name="Picture 2">
+            <a:extLst>
+              <a:ext uri="{FF2B5EF4-FFF2-40B4-BE49-F238E27FC236}">
+                <a16:creationId xmlns:a16="http://schemas.microsoft.com/office/drawing/2014/main" id="{A8608CC7-FB7A-C153-855B-304559E71430}"/>
+              </a:ext>
+            </a:extLst>
+          </p:cNvPr>
+          <p:cNvPicPr>
+            <a:picLocks noChangeAspect="1"/>
+          </p:cNvPicPr>
+          <p:nvPr/>
+        </p:nvPicPr>
+        <p:blipFill>
+          <a:blip r:embed="rId2">
+            <a:extLst>
+              <a:ext uri="{28A0092B-C50C-407E-A947-70E740481C1C}">
+                <a14:useLocalDpi xmlns:a14="http://schemas.microsoft.com/office/drawing/2010/main" val="0"/>
+              </a:ext>
+            </a:extLst>
+          </a:blip>
+          <a:stretch>
+            <a:fillRect/>
+          </a:stretch>
+        </p:blipFill>
+        <p:spPr>
+          <a:xfrm>
+            <a:off x="7764407" y="1604866"/>
+            <a:ext cx="4194327" cy="2291151"/>
+          </a:xfrm>
+          <a:prstGeom prst="rect">
+            <a:avLst/>
+          </a:prstGeom>
+        </p:spPr>
+      </p:pic>
     </p:spTree>
     <p:extLst>
       <p:ext uri="{BB962C8B-B14F-4D97-AF65-F5344CB8AC3E}">

</xml_diff>